<commit_message>
Added Support for below major chart type with all available 2D child options - Bar Chart - Column Chart - Line Chart - Area Chart
</commit_message>
<xml_diff>
--- a/Tests/TestFiles/basic_test.pptx
+++ b/Tests/TestFiles/basic_test.pptx
@@ -1199,7 +1199,7 @@
           <a:p>
             <a:fld id="{1ED27D58-5864-442F-A1A3-A649AB81573E}" type="datetimeFigureOut">
               <a:rPr lang="en-IN" smtClean="0"/>
-              <a:t>10-12-2023</a:t>
+              <a:t>28-12-2023</a:t>
             </a:fld>
             <a:endParaRPr lang="en-IN"/>
           </a:p>
@@ -1616,7 +1616,7 @@
           <a:p>
             <a:fld id="{276052AD-8502-470A-85AA-5B0D9839827D}" type="datetimeFigureOut">
               <a:rPr lang="en-IN" smtClean="0"/>
-              <a:t>10-12-2023</a:t>
+              <a:t>28-12-2023</a:t>
             </a:fld>
             <a:endParaRPr lang="en-IN"/>
           </a:p>
@@ -1816,7 +1816,7 @@
           <a:p>
             <a:fld id="{276052AD-8502-470A-85AA-5B0D9839827D}" type="datetimeFigureOut">
               <a:rPr lang="en-IN" smtClean="0"/>
-              <a:t>10-12-2023</a:t>
+              <a:t>28-12-2023</a:t>
             </a:fld>
             <a:endParaRPr lang="en-IN"/>
           </a:p>
@@ -2026,7 +2026,7 @@
           <a:p>
             <a:fld id="{276052AD-8502-470A-85AA-5B0D9839827D}" type="datetimeFigureOut">
               <a:rPr lang="en-IN" smtClean="0"/>
-              <a:t>10-12-2023</a:t>
+              <a:t>28-12-2023</a:t>
             </a:fld>
             <a:endParaRPr lang="en-IN"/>
           </a:p>
@@ -2226,7 +2226,7 @@
           <a:p>
             <a:fld id="{276052AD-8502-470A-85AA-5B0D9839827D}" type="datetimeFigureOut">
               <a:rPr lang="en-IN" smtClean="0"/>
-              <a:t>10-12-2023</a:t>
+              <a:t>28-12-2023</a:t>
             </a:fld>
             <a:endParaRPr lang="en-IN"/>
           </a:p>
@@ -2502,7 +2502,7 @@
           <a:p>
             <a:fld id="{276052AD-8502-470A-85AA-5B0D9839827D}" type="datetimeFigureOut">
               <a:rPr lang="en-IN" smtClean="0"/>
-              <a:t>10-12-2023</a:t>
+              <a:t>28-12-2023</a:t>
             </a:fld>
             <a:endParaRPr lang="en-IN"/>
           </a:p>
@@ -2770,7 +2770,7 @@
           <a:p>
             <a:fld id="{276052AD-8502-470A-85AA-5B0D9839827D}" type="datetimeFigureOut">
               <a:rPr lang="en-IN" smtClean="0"/>
-              <a:t>10-12-2023</a:t>
+              <a:t>28-12-2023</a:t>
             </a:fld>
             <a:endParaRPr lang="en-IN"/>
           </a:p>
@@ -3185,7 +3185,7 @@
           <a:p>
             <a:fld id="{276052AD-8502-470A-85AA-5B0D9839827D}" type="datetimeFigureOut">
               <a:rPr lang="en-IN" smtClean="0"/>
-              <a:t>10-12-2023</a:t>
+              <a:t>28-12-2023</a:t>
             </a:fld>
             <a:endParaRPr lang="en-IN"/>
           </a:p>
@@ -3327,7 +3327,7 @@
           <a:p>
             <a:fld id="{276052AD-8502-470A-85AA-5B0D9839827D}" type="datetimeFigureOut">
               <a:rPr lang="en-IN" smtClean="0"/>
-              <a:t>10-12-2023</a:t>
+              <a:t>28-12-2023</a:t>
             </a:fld>
             <a:endParaRPr lang="en-IN"/>
           </a:p>
@@ -3440,7 +3440,7 @@
           <a:p>
             <a:fld id="{276052AD-8502-470A-85AA-5B0D9839827D}" type="datetimeFigureOut">
               <a:rPr lang="en-IN" smtClean="0"/>
-              <a:t>10-12-2023</a:t>
+              <a:t>28-12-2023</a:t>
             </a:fld>
             <a:endParaRPr lang="en-IN"/>
           </a:p>
@@ -3753,7 +3753,7 @@
           <a:p>
             <a:fld id="{276052AD-8502-470A-85AA-5B0D9839827D}" type="datetimeFigureOut">
               <a:rPr lang="en-IN" smtClean="0"/>
-              <a:t>10-12-2023</a:t>
+              <a:t>28-12-2023</a:t>
             </a:fld>
             <a:endParaRPr lang="en-IN"/>
           </a:p>
@@ -4042,7 +4042,7 @@
           <a:p>
             <a:fld id="{276052AD-8502-470A-85AA-5B0D9839827D}" type="datetimeFigureOut">
               <a:rPr lang="en-IN" smtClean="0"/>
-              <a:t>10-12-2023</a:t>
+              <a:t>28-12-2023</a:t>
             </a:fld>
             <a:endParaRPr lang="en-IN"/>
           </a:p>
@@ -4285,7 +4285,7 @@
           <a:p>
             <a:fld id="{276052AD-8502-470A-85AA-5B0D9839827D}" type="datetimeFigureOut">
               <a:rPr lang="en-IN" smtClean="0"/>
-              <a:t>10-12-2023</a:t>
+              <a:t>28-12-2023</a:t>
             </a:fld>
             <a:endParaRPr lang="en-IN"/>
           </a:p>
@@ -4716,7 +4716,7 @@
         </p:nvSpPr>
         <p:spPr>
           <a:xfrm>
-            <a:off x="2568742" y="1311442"/>
+            <a:off x="1828800" y="378995"/>
             <a:ext cx="1834816" cy="1515979"/>
           </a:xfrm>
           <a:prstGeom prst="rect">
@@ -4765,7 +4765,7 @@
         </p:nvSpPr>
         <p:spPr>
           <a:xfrm>
-            <a:off x="6196263" y="2881563"/>
+            <a:off x="1828800" y="2219826"/>
             <a:ext cx="1852863" cy="1528011"/>
           </a:xfrm>
           <a:prstGeom prst="rect">
@@ -4802,10 +4802,206 @@
       </p:sp>
       <p:sp>
         <p:nvSpPr>
+          <p:cNvPr id="3" name="Rectangle 2">
+            <a:extLst>
+              <a:ext uri="{FF2B5EF4-FFF2-40B4-BE49-F238E27FC236}">
+                <a16:creationId xmlns:a16="http://schemas.microsoft.com/office/drawing/2014/main" id="{FD5329E4-6CD7-A0E2-7592-ECD91E299401}"/>
+              </a:ext>
+            </a:extLst>
+          </p:cNvPr>
+          <p:cNvSpPr/>
+          <p:nvPr/>
+        </p:nvSpPr>
+        <p:spPr>
+          <a:xfrm>
+            <a:off x="1828800" y="4072688"/>
+            <a:ext cx="1852863" cy="1528011"/>
+          </a:xfrm>
+          <a:prstGeom prst="rect">
+            <a:avLst/>
+          </a:prstGeom>
+        </p:spPr>
+        <p:style>
+          <a:lnRef idx="2">
+            <a:schemeClr val="accent2">
+              <a:shade val="15000"/>
+            </a:schemeClr>
+          </a:lnRef>
+          <a:fillRef idx="1">
+            <a:schemeClr val="accent2"/>
+          </a:fillRef>
+          <a:effectRef idx="0">
+            <a:schemeClr val="accent2"/>
+          </a:effectRef>
+          <a:fontRef idx="minor">
+            <a:schemeClr val="lt1"/>
+          </a:fontRef>
+        </p:style>
+        <p:txBody>
+          <a:bodyPr rtlCol="0" anchor="ctr"/>
+          <a:lstStyle/>
+          <a:p>
+            <a:pPr algn="ctr"/>
+            <a:r>
+              <a:rPr lang="en-IN" dirty="0"/>
+              <a:t>Slide_1_Shape_3</a:t>
+            </a:r>
+          </a:p>
+        </p:txBody>
+      </p:sp>
+      <p:sp>
+        <p:nvSpPr>
+          <p:cNvPr id="6" name="Rectangle 5">
+            <a:extLst>
+              <a:ext uri="{FF2B5EF4-FFF2-40B4-BE49-F238E27FC236}">
+                <a16:creationId xmlns:a16="http://schemas.microsoft.com/office/drawing/2014/main" id="{8B520FB2-B3BE-A329-0FE1-2C88D4C01AAA}"/>
+              </a:ext>
+            </a:extLst>
+          </p:cNvPr>
+          <p:cNvSpPr/>
+          <p:nvPr/>
+        </p:nvSpPr>
+        <p:spPr>
+          <a:xfrm>
+            <a:off x="4339390" y="378994"/>
+            <a:ext cx="1834816" cy="1515979"/>
+          </a:xfrm>
+          <a:prstGeom prst="rect">
+            <a:avLst/>
+          </a:prstGeom>
+        </p:spPr>
+        <p:style>
+          <a:lnRef idx="2">
+            <a:schemeClr val="accent1">
+              <a:shade val="15000"/>
+            </a:schemeClr>
+          </a:lnRef>
+          <a:fillRef idx="1">
+            <a:schemeClr val="accent1"/>
+          </a:fillRef>
+          <a:effectRef idx="0">
+            <a:schemeClr val="accent1"/>
+          </a:effectRef>
+          <a:fontRef idx="minor">
+            <a:schemeClr val="lt1"/>
+          </a:fontRef>
+        </p:style>
+        <p:txBody>
+          <a:bodyPr rtlCol="0" anchor="ctr"/>
+          <a:lstStyle/>
+          <a:p>
+            <a:pPr algn="ctr"/>
+            <a:r>
+              <a:rPr lang="en-IN" dirty="0"/>
+              <a:t>Slide_1_Shape_4</a:t>
+            </a:r>
+          </a:p>
+        </p:txBody>
+      </p:sp>
+      <p:sp>
+        <p:nvSpPr>
+          <p:cNvPr id="7" name="Rectangle 6">
+            <a:extLst>
+              <a:ext uri="{FF2B5EF4-FFF2-40B4-BE49-F238E27FC236}">
+                <a16:creationId xmlns:a16="http://schemas.microsoft.com/office/drawing/2014/main" id="{17D52DC3-C8C5-82EE-484C-264CE4F51280}"/>
+              </a:ext>
+            </a:extLst>
+          </p:cNvPr>
+          <p:cNvSpPr/>
+          <p:nvPr/>
+        </p:nvSpPr>
+        <p:spPr>
+          <a:xfrm>
+            <a:off x="4339390" y="2225841"/>
+            <a:ext cx="1834816" cy="1515979"/>
+          </a:xfrm>
+          <a:prstGeom prst="rect">
+            <a:avLst/>
+          </a:prstGeom>
+        </p:spPr>
+        <p:style>
+          <a:lnRef idx="2">
+            <a:schemeClr val="accent1">
+              <a:shade val="15000"/>
+            </a:schemeClr>
+          </a:lnRef>
+          <a:fillRef idx="1">
+            <a:schemeClr val="accent1"/>
+          </a:fillRef>
+          <a:effectRef idx="0">
+            <a:schemeClr val="accent1"/>
+          </a:effectRef>
+          <a:fontRef idx="minor">
+            <a:schemeClr val="lt1"/>
+          </a:fontRef>
+        </p:style>
+        <p:txBody>
+          <a:bodyPr rtlCol="0" anchor="ctr"/>
+          <a:lstStyle/>
+          <a:p>
+            <a:pPr algn="ctr"/>
+            <a:r>
+              <a:rPr lang="en-IN" dirty="0"/>
+              <a:t>Slide_1_Shape_5</a:t>
+            </a:r>
+          </a:p>
+        </p:txBody>
+      </p:sp>
+      <p:sp>
+        <p:nvSpPr>
+          <p:cNvPr id="8" name="Rectangle 7">
+            <a:extLst>
+              <a:ext uri="{FF2B5EF4-FFF2-40B4-BE49-F238E27FC236}">
+                <a16:creationId xmlns:a16="http://schemas.microsoft.com/office/drawing/2014/main" id="{6CBC93A7-3866-3959-38C2-2AAEBCFE6944}"/>
+              </a:ext>
+            </a:extLst>
+          </p:cNvPr>
+          <p:cNvSpPr/>
+          <p:nvPr/>
+        </p:nvSpPr>
+        <p:spPr>
+          <a:xfrm>
+            <a:off x="4339390" y="4072688"/>
+            <a:ext cx="1852863" cy="1528011"/>
+          </a:xfrm>
+          <a:prstGeom prst="rect">
+            <a:avLst/>
+          </a:prstGeom>
+        </p:spPr>
+        <p:style>
+          <a:lnRef idx="2">
+            <a:schemeClr val="accent2">
+              <a:shade val="15000"/>
+            </a:schemeClr>
+          </a:lnRef>
+          <a:fillRef idx="1">
+            <a:schemeClr val="accent2"/>
+          </a:fillRef>
+          <a:effectRef idx="0">
+            <a:schemeClr val="accent2"/>
+          </a:effectRef>
+          <a:fontRef idx="minor">
+            <a:schemeClr val="lt1"/>
+          </a:fontRef>
+        </p:style>
+        <p:txBody>
+          <a:bodyPr rtlCol="0" anchor="ctr"/>
+          <a:lstStyle/>
+          <a:p>
+            <a:pPr algn="ctr"/>
+            <a:r>
+              <a:rPr lang="en-IN" dirty="0"/>
+              <a:t>Slide_1_Shape_6</a:t>
+            </a:r>
+          </a:p>
+        </p:txBody>
+      </p:sp>
+      <p:sp>
+        <p:nvSpPr>
           <p:cNvPr id="2" name="TextBox 1">
             <a:extLst>
               <a:ext uri="{FF2B5EF4-FFF2-40B4-BE49-F238E27FC236}">
-                <a16:creationId xmlns:a16="http://schemas.microsoft.com/office/drawing/2014/main" id="{C7B9832C-DA92-73EB-9C0C-72F49D113358}"/>
+                <a16:creationId xmlns:a16="http://schemas.microsoft.com/office/drawing/2014/main" id="{52539E01-A21C-9D3B-80E3-A76F985D9A34}"/>
               </a:ext>
             </a:extLst>
           </p:cNvPr>
@@ -4814,8 +5010,8 @@
         </p:nvSpPr>
         <p:spPr>
           <a:xfrm>
-            <a:off x="1600200" y="3735804"/>
-            <a:ext cx="2292016" cy="369332"/>
+            <a:off x="7808495" y="2935705"/>
+            <a:ext cx="1577676" cy="369332"/>
           </a:xfrm>
           <a:prstGeom prst="rect">
             <a:avLst/>
@@ -4823,16 +5019,28 @@
           <a:noFill/>
         </p:spPr>
         <p:txBody>
-          <a:bodyPr wrap="square" rtlCol="0">
+          <a:bodyPr wrap="none" rtlCol="0">
             <a:spAutoFit/>
           </a:bodyPr>
           <a:lstStyle/>
           <a:p>
             <a:r>
-              <a:rPr lang="en-GB" dirty="0"/>
+              <a:rPr lang="en-IN" b="0" dirty="0">
+                <a:solidFill>
+                  <a:srgbClr val="CE9178"/>
+                </a:solidFill>
+                <a:effectLst/>
+                <a:latin typeface="Consolas" panose="020B0609020204030204" pitchFamily="49" charset="0"/>
+              </a:rPr>
               <a:t>Test Update</a:t>
             </a:r>
-            <a:endParaRPr lang="en-IN" dirty="0"/>
+            <a:endParaRPr lang="en-IN" b="0" dirty="0">
+              <a:solidFill>
+                <a:srgbClr val="CCCCCC"/>
+              </a:solidFill>
+              <a:effectLst/>
+              <a:latin typeface="Consolas" panose="020B0609020204030204" pitchFamily="49" charset="0"/>
+            </a:endParaRPr>
           </a:p>
         </p:txBody>
       </p:sp>

</xml_diff>

<commit_message>
Removing Shape from test suit - TODO: Update once shape implementation is completed
</commit_message>
<xml_diff>
--- a/Tests/TestFiles/basic_test.pptx
+++ b/Tests/TestFiles/basic_test.pptx
@@ -1199,7 +1199,7 @@
           <a:p>
             <a:fld id="{1ED27D58-5864-442F-A1A3-A649AB81573E}" type="datetimeFigureOut">
               <a:rPr lang="en-IN" smtClean="0"/>
-              <a:t>28-12-2023</a:t>
+              <a:t>14-07-2024</a:t>
             </a:fld>
             <a:endParaRPr lang="en-IN"/>
           </a:p>
@@ -1616,7 +1616,7 @@
           <a:p>
             <a:fld id="{276052AD-8502-470A-85AA-5B0D9839827D}" type="datetimeFigureOut">
               <a:rPr lang="en-IN" smtClean="0"/>
-              <a:t>28-12-2023</a:t>
+              <a:t>14-07-2024</a:t>
             </a:fld>
             <a:endParaRPr lang="en-IN"/>
           </a:p>
@@ -1816,7 +1816,7 @@
           <a:p>
             <a:fld id="{276052AD-8502-470A-85AA-5B0D9839827D}" type="datetimeFigureOut">
               <a:rPr lang="en-IN" smtClean="0"/>
-              <a:t>28-12-2023</a:t>
+              <a:t>14-07-2024</a:t>
             </a:fld>
             <a:endParaRPr lang="en-IN"/>
           </a:p>
@@ -2026,7 +2026,7 @@
           <a:p>
             <a:fld id="{276052AD-8502-470A-85AA-5B0D9839827D}" type="datetimeFigureOut">
               <a:rPr lang="en-IN" smtClean="0"/>
-              <a:t>28-12-2023</a:t>
+              <a:t>14-07-2024</a:t>
             </a:fld>
             <a:endParaRPr lang="en-IN"/>
           </a:p>
@@ -2226,7 +2226,7 @@
           <a:p>
             <a:fld id="{276052AD-8502-470A-85AA-5B0D9839827D}" type="datetimeFigureOut">
               <a:rPr lang="en-IN" smtClean="0"/>
-              <a:t>28-12-2023</a:t>
+              <a:t>14-07-2024</a:t>
             </a:fld>
             <a:endParaRPr lang="en-IN"/>
           </a:p>
@@ -2502,7 +2502,7 @@
           <a:p>
             <a:fld id="{276052AD-8502-470A-85AA-5B0D9839827D}" type="datetimeFigureOut">
               <a:rPr lang="en-IN" smtClean="0"/>
-              <a:t>28-12-2023</a:t>
+              <a:t>14-07-2024</a:t>
             </a:fld>
             <a:endParaRPr lang="en-IN"/>
           </a:p>
@@ -2770,7 +2770,7 @@
           <a:p>
             <a:fld id="{276052AD-8502-470A-85AA-5B0D9839827D}" type="datetimeFigureOut">
               <a:rPr lang="en-IN" smtClean="0"/>
-              <a:t>28-12-2023</a:t>
+              <a:t>14-07-2024</a:t>
             </a:fld>
             <a:endParaRPr lang="en-IN"/>
           </a:p>
@@ -3185,7 +3185,7 @@
           <a:p>
             <a:fld id="{276052AD-8502-470A-85AA-5B0D9839827D}" type="datetimeFigureOut">
               <a:rPr lang="en-IN" smtClean="0"/>
-              <a:t>28-12-2023</a:t>
+              <a:t>14-07-2024</a:t>
             </a:fld>
             <a:endParaRPr lang="en-IN"/>
           </a:p>
@@ -3327,7 +3327,7 @@
           <a:p>
             <a:fld id="{276052AD-8502-470A-85AA-5B0D9839827D}" type="datetimeFigureOut">
               <a:rPr lang="en-IN" smtClean="0"/>
-              <a:t>28-12-2023</a:t>
+              <a:t>14-07-2024</a:t>
             </a:fld>
             <a:endParaRPr lang="en-IN"/>
           </a:p>
@@ -3440,7 +3440,7 @@
           <a:p>
             <a:fld id="{276052AD-8502-470A-85AA-5B0D9839827D}" type="datetimeFigureOut">
               <a:rPr lang="en-IN" smtClean="0"/>
-              <a:t>28-12-2023</a:t>
+              <a:t>14-07-2024</a:t>
             </a:fld>
             <a:endParaRPr lang="en-IN"/>
           </a:p>
@@ -3753,7 +3753,7 @@
           <a:p>
             <a:fld id="{276052AD-8502-470A-85AA-5B0D9839827D}" type="datetimeFigureOut">
               <a:rPr lang="en-IN" smtClean="0"/>
-              <a:t>28-12-2023</a:t>
+              <a:t>14-07-2024</a:t>
             </a:fld>
             <a:endParaRPr lang="en-IN"/>
           </a:p>
@@ -4042,7 +4042,7 @@
           <a:p>
             <a:fld id="{276052AD-8502-470A-85AA-5B0D9839827D}" type="datetimeFigureOut">
               <a:rPr lang="en-IN" smtClean="0"/>
-              <a:t>28-12-2023</a:t>
+              <a:t>14-07-2024</a:t>
             </a:fld>
             <a:endParaRPr lang="en-IN"/>
           </a:p>
@@ -4285,7 +4285,7 @@
           <a:p>
             <a:fld id="{276052AD-8502-470A-85AA-5B0D9839827D}" type="datetimeFigureOut">
               <a:rPr lang="en-IN" smtClean="0"/>
-              <a:t>28-12-2023</a:t>
+              <a:t>14-07-2024</a:t>
             </a:fld>
             <a:endParaRPr lang="en-IN"/>
           </a:p>
@@ -5010,8 +5010,8 @@
         </p:nvSpPr>
         <p:spPr>
           <a:xfrm>
-            <a:off x="7808495" y="2935705"/>
-            <a:ext cx="1577676" cy="369332"/>
+            <a:off x="6238374" y="54142"/>
+            <a:ext cx="5889458" cy="369332"/>
           </a:xfrm>
           <a:prstGeom prst="rect">
             <a:avLst/>
@@ -5019,7 +5019,7 @@
           <a:noFill/>
         </p:spPr>
         <p:txBody>
-          <a:bodyPr wrap="none" rtlCol="0">
+          <a:bodyPr wrap="square" rtlCol="0">
             <a:spAutoFit/>
           </a:bodyPr>
           <a:lstStyle/>

</xml_diff>